<commit_message>
Update Good Light For Working.pptx
</commit_message>
<xml_diff>
--- a/Presentation/Good Light For Working.pptx
+++ b/Presentation/Good Light For Working.pptx
@@ -251,7 +251,7 @@
   </p:defaultTextStyle>
   <p:extLst>
     <p:ext uri="{EFAFB233-063F-42B5-8137-9DF3F51BA10A}">
-      <p15:sldGuideLst xmlns="" xmlns:mc="http://schemas.openxmlformats.org/markup-compatibility/2006" xmlns:mv="urn:schemas-microsoft-com:mac:vml" xmlns:c="http://schemas.openxmlformats.org/drawingml/2006/chart" xmlns:dgm="http://schemas.openxmlformats.org/drawingml/2006/diagram" xmlns:o="urn:schemas-microsoft-com:office:office" xmlns:v="urn:schemas-microsoft-com:vml" xmlns:pvml="urn:schemas-microsoft-com:office:powerpoint" xmlns:com="http://schemas.openxmlformats.org/drawingml/2006/compatibility" xmlns:p14="http://schemas.microsoft.com/office/powerpoint/2010/main" xmlns:p15="http://schemas.microsoft.com/office/powerpoint/2012/main">
+      <p15:sldGuideLst xmlns:p15="http://schemas.microsoft.com/office/powerpoint/2012/main" xmlns:p14="http://schemas.microsoft.com/office/powerpoint/2010/main" xmlns:com="http://schemas.openxmlformats.org/drawingml/2006/compatibility" xmlns:pvml="urn:schemas-microsoft-com:office:powerpoint" xmlns:v="urn:schemas-microsoft-com:vml" xmlns:o="urn:schemas-microsoft-com:office:office" xmlns:dgm="http://schemas.openxmlformats.org/drawingml/2006/diagram" xmlns:c="http://schemas.openxmlformats.org/drawingml/2006/chart" xmlns:mv="urn:schemas-microsoft-com:mac:vml" xmlns:mc="http://schemas.openxmlformats.org/markup-compatibility/2006" xmlns="">
         <p15:guide id="1" orient="horz" pos="2160">
           <p15:clr>
             <a:srgbClr val="A4A3A4"/>
@@ -501,6 +501,7 @@
           <a:p>
             <a:fld id="{EA203B95-0EC8-4C81-AF52-AF19BFB84E1C}" type="slidenum">
               <a:rPr lang="en-US" smtClean="0"/>
+              <a:pPr/>
               <a:t>‹#›</a:t>
             </a:fld>
             <a:endParaRPr lang="en-US"/>
@@ -5114,43 +5115,7 @@
                 <a:cs typeface="Arial"/>
                 <a:sym typeface="Arial"/>
               </a:rPr>
-              <a:t>Manraj </a:t>
-            </a:r>
-            <a:r>
-              <a:rPr lang="en-IN" sz="1000" b="0" i="0" u="none" strike="noStrike" cap="none" baseline="0" dirty="0" smtClean="0">
-                <a:solidFill>
-                  <a:schemeClr val="lt1"/>
-                </a:solidFill>
-                <a:latin typeface="Arial"/>
-                <a:ea typeface="Arial"/>
-                <a:cs typeface="Arial"/>
-                <a:sym typeface="Arial"/>
-              </a:rPr>
-              <a:t>Singh, </a:t>
-            </a:r>
-            <a:r>
-              <a:rPr lang="en-IN" sz="1000" b="0" i="0" u="none" strike="noStrike" cap="none" baseline="0" dirty="0" smtClean="0">
-                <a:solidFill>
-                  <a:schemeClr val="lt1"/>
-                </a:solidFill>
-                <a:latin typeface="Arial"/>
-                <a:ea typeface="Arial"/>
-                <a:cs typeface="Arial"/>
-                <a:sym typeface="Arial"/>
-              </a:rPr>
-              <a:t>Tanvi </a:t>
-            </a:r>
-            <a:r>
-              <a:rPr lang="en-IN" sz="1000" b="0" i="0" u="none" strike="noStrike" cap="none" baseline="0" dirty="0" smtClean="0">
-                <a:solidFill>
-                  <a:schemeClr val="lt1"/>
-                </a:solidFill>
-                <a:latin typeface="Arial"/>
-                <a:ea typeface="Arial"/>
-                <a:cs typeface="Arial"/>
-                <a:sym typeface="Arial"/>
-              </a:rPr>
-              <a:t>Singh, Saqib Nawaz</a:t>
+              <a:t>Manraj Singh, Tanvi Singh, Saqib Nawaz</a:t>
             </a:r>
           </a:p>
           <a:p>
@@ -6433,34 +6398,21 @@
             <a:pPr algn="ctr"/>
             <a:r>
               <a:rPr lang="en-US" sz="1800" dirty="0" smtClean="0"/>
-              <a:t>Manraj </a:t>
-            </a:r>
-            <a:r>
-              <a:rPr lang="en-US" sz="1800" dirty="0" smtClean="0"/>
-              <a:t>Singh</a:t>
-            </a:r>
-            <a:endParaRPr lang="en-US" sz="1800" dirty="0" smtClean="0"/>
-          </a:p>
-          <a:p>
-            <a:pPr algn="ctr"/>
-            <a:r>
-              <a:rPr lang="en-US" sz="1800" dirty="0" smtClean="0"/>
-              <a:t>Tanvi </a:t>
-            </a:r>
-            <a:r>
-              <a:rPr lang="en-US" sz="1800" dirty="0" smtClean="0"/>
-              <a:t>Singh</a:t>
+              <a:t>Manraj Singh</a:t>
             </a:r>
           </a:p>
           <a:p>
             <a:pPr algn="ctr"/>
             <a:r>
               <a:rPr lang="en-US" sz="1800" dirty="0" smtClean="0"/>
-              <a:t>Saqib </a:t>
+              <a:t>Tanvi Singh</a:t>
             </a:r>
+          </a:p>
+          <a:p>
+            <a:pPr algn="ctr"/>
             <a:r>
               <a:rPr lang="en-US" sz="1800" dirty="0" smtClean="0"/>
-              <a:t>Nawaz</a:t>
+              <a:t>Saqib Nawaz</a:t>
             </a:r>
             <a:endParaRPr lang="en-US" sz="1800" dirty="0"/>
           </a:p>
@@ -7490,13 +7442,8 @@
             </a:pPr>
             <a:r>
               <a:rPr lang="en-US" sz="1800" dirty="0" smtClean="0"/>
-              <a:t>LDR(Light-Dependent Resistor)/</a:t>
+              <a:t>LDR(Light-Dependent Resistor)/Photocell</a:t>
             </a:r>
-            <a:r>
-              <a:rPr lang="en-US" sz="1800" dirty="0" smtClean="0"/>
-              <a:t>Photocell</a:t>
-            </a:r>
-            <a:endParaRPr lang="en-US" sz="1800" dirty="0" smtClean="0"/>
           </a:p>
           <a:p>
             <a:pPr>
@@ -7509,13 +7456,8 @@
             </a:pPr>
             <a:r>
               <a:rPr lang="en-US" sz="1800" dirty="0" smtClean="0"/>
-              <a:t>220 ohm resistor </a:t>
+              <a:t>220 ohm resistor x 1</a:t>
             </a:r>
-            <a:r>
-              <a:rPr lang="en-US" sz="1800" dirty="0" smtClean="0"/>
-              <a:t>x 1</a:t>
-            </a:r>
-            <a:endParaRPr lang="en-US" sz="1800" dirty="0" smtClean="0"/>
           </a:p>
           <a:p>
             <a:pPr>
@@ -7528,11 +7470,15 @@
             </a:pPr>
             <a:r>
               <a:rPr lang="en-US" sz="1800" dirty="0" smtClean="0"/>
-              <a:t>Jumper wires x </a:t>
+              <a:t>Jumper wires </a:t>
             </a:r>
             <a:r>
-              <a:rPr lang="en-US" sz="1800" dirty="0" smtClean="0"/>
-              <a:t>10</a:t>
+              <a:rPr lang="en-US" sz="1800" smtClean="0"/>
+              <a:t>x </a:t>
+            </a:r>
+            <a:r>
+              <a:rPr lang="en-US" sz="1800" smtClean="0"/>
+              <a:t>5</a:t>
             </a:r>
             <a:endParaRPr lang="en-US" sz="1800" dirty="0" smtClean="0"/>
           </a:p>
@@ -7856,7 +7802,7 @@
       </p:sp>
       <p:pic>
         <p:nvPicPr>
-          <p:cNvPr id="6148" name="Picture 4" descr="C:\Users\Saqib\Desktop\Flow Chart.png"/>
+          <p:cNvPr id="1026" name="Picture 2" descr="C:\Users\Saqib\Desktop\Flow Chart.png"/>
           <p:cNvPicPr>
             <a:picLocks noChangeAspect="1" noChangeArrowheads="1"/>
           </p:cNvPicPr>
@@ -7871,8 +7817,8 @@
         </p:blipFill>
         <p:spPr bwMode="auto">
           <a:xfrm>
-            <a:off x="2773089" y="664178"/>
-            <a:ext cx="3757613" cy="5357812"/>
+            <a:off x="3001963" y="658813"/>
+            <a:ext cx="3757612" cy="5357812"/>
           </a:xfrm>
           <a:prstGeom prst="rect">
             <a:avLst/>

</xml_diff>